<commit_message>
Update web service presentation deck and version control deck
</commit_message>
<xml_diff>
--- a/lectures/050_git_version_control/Why do you need version control.pptx
+++ b/lectures/050_git_version_control/Why do you need version control.pptx
@@ -25,9 +25,10 @@
     <p:sldId id="273" r:id="rId19"/>
     <p:sldId id="274" r:id="rId20"/>
     <p:sldId id="277" r:id="rId21"/>
-    <p:sldId id="278" r:id="rId22"/>
-    <p:sldId id="275" r:id="rId23"/>
-    <p:sldId id="276" r:id="rId24"/>
+    <p:sldId id="279" r:id="rId22"/>
+    <p:sldId id="278" r:id="rId23"/>
+    <p:sldId id="275" r:id="rId24"/>
+    <p:sldId id="276" r:id="rId25"/>
   </p:sldIdLst>
   <p:sldSz cx="12192000" cy="6858000"/>
   <p:notesSz cx="6858000" cy="9144000"/>
@@ -126,13 +127,18 @@
       </a:defRPr>
     </a:lvl9pPr>
   </p:defaultTextStyle>
+  <p:extLst>
+    <p:ext uri="{EFAFB233-063F-42B5-8137-9DF3F51BA10A}">
+      <p15:sldGuideLst xmlns:p15="http://schemas.microsoft.com/office/powerpoint/2012/main"/>
+    </p:ext>
+  </p:extLst>
 </p:presentation>
 </file>
 
 <file path=ppt/revisionInfo.xml><?xml version="1.0" encoding="utf-8"?>
 <p1510:revInfo xmlns:a="http://schemas.openxmlformats.org/drawingml/2006/main" xmlns:r="http://schemas.openxmlformats.org/officeDocument/2006/relationships" xmlns:p1510="http://schemas.microsoft.com/office/powerpoint/2015/10/main">
   <p1510:revLst>
-    <p1510:client id="{D58A60B7-084E-45CF-BD23-7CA072B788BD}" v="49" dt="2024-01-17T17:29:28.648"/>
+    <p1510:client id="{D58A60B7-084E-45CF-BD23-7CA072B788BD}" v="56" dt="2024-01-17T17:45:07.799"/>
   </p1510:revLst>
 </p1510:revInfo>
 </file>
@@ -141,8 +147,8 @@
 <pc:chgInfo xmlns:a="http://schemas.openxmlformats.org/drawingml/2006/main" xmlns:r="http://schemas.openxmlformats.org/officeDocument/2006/relationships" xmlns:ac="http://schemas.microsoft.com/office/drawing/2013/main/command" xmlns:pc="http://schemas.microsoft.com/office/powerpoint/2013/main/command">
   <pc:docChgLst>
     <pc:chgData name="Shahbaz Chaudhary" userId="fef21e47db54da50" providerId="LiveId" clId="{D58A60B7-084E-45CF-BD23-7CA072B788BD}"/>
-    <pc:docChg chg="custSel addSld delSld modSld sldOrd modMainMaster">
-      <pc:chgData name="Shahbaz Chaudhary" userId="fef21e47db54da50" providerId="LiveId" clId="{D58A60B7-084E-45CF-BD23-7CA072B788BD}" dt="2024-01-17T17:33:56.819" v="2098" actId="1076"/>
+    <pc:docChg chg="undo custSel addSld delSld modSld sldOrd modMainMaster">
+      <pc:chgData name="Shahbaz Chaudhary" userId="fef21e47db54da50" providerId="LiveId" clId="{D58A60B7-084E-45CF-BD23-7CA072B788BD}" dt="2024-01-17T17:48:28.109" v="2811" actId="313"/>
       <pc:docMkLst>
         <pc:docMk/>
       </pc:docMkLst>
@@ -848,13 +854,13 @@
         </pc:cxnChg>
       </pc:sldChg>
       <pc:sldChg chg="addSp modSp new mod">
-        <pc:chgData name="Shahbaz Chaudhary" userId="fef21e47db54da50" providerId="LiveId" clId="{D58A60B7-084E-45CF-BD23-7CA072B788BD}" dt="2024-01-17T17:33:56.819" v="2098" actId="1076"/>
+        <pc:chgData name="Shahbaz Chaudhary" userId="fef21e47db54da50" providerId="LiveId" clId="{D58A60B7-084E-45CF-BD23-7CA072B788BD}" dt="2024-01-17T17:40:38.225" v="2258" actId="20577"/>
         <pc:sldMkLst>
           <pc:docMk/>
           <pc:sldMk cId="3977715652" sldId="278"/>
         </pc:sldMkLst>
         <pc:spChg chg="mod">
-          <ac:chgData name="Shahbaz Chaudhary" userId="fef21e47db54da50" providerId="LiveId" clId="{D58A60B7-084E-45CF-BD23-7CA072B788BD}" dt="2024-01-17T17:28:18.832" v="1796" actId="2711"/>
+          <ac:chgData name="Shahbaz Chaudhary" userId="fef21e47db54da50" providerId="LiveId" clId="{D58A60B7-084E-45CF-BD23-7CA072B788BD}" dt="2024-01-17T17:38:01.651" v="2136" actId="20577"/>
           <ac:spMkLst>
             <pc:docMk/>
             <pc:sldMk cId="3977715652" sldId="278"/>
@@ -862,19 +868,114 @@
           </ac:spMkLst>
         </pc:spChg>
         <pc:spChg chg="add mod">
-          <ac:chgData name="Shahbaz Chaudhary" userId="fef21e47db54da50" providerId="LiveId" clId="{D58A60B7-084E-45CF-BD23-7CA072B788BD}" dt="2024-01-17T17:31:46.267" v="2095" actId="113"/>
+          <ac:chgData name="Shahbaz Chaudhary" userId="fef21e47db54da50" providerId="LiveId" clId="{D58A60B7-084E-45CF-BD23-7CA072B788BD}" dt="2024-01-17T17:39:04.326" v="2144" actId="1076"/>
           <ac:spMkLst>
             <pc:docMk/>
             <pc:sldMk cId="3977715652" sldId="278"/>
             <ac:spMk id="3" creationId="{E19DCBD9-6321-0818-3D62-1148817A0583}"/>
           </ac:spMkLst>
         </pc:spChg>
+        <pc:spChg chg="add mod">
+          <ac:chgData name="Shahbaz Chaudhary" userId="fef21e47db54da50" providerId="LiveId" clId="{D58A60B7-084E-45CF-BD23-7CA072B788BD}" dt="2024-01-17T17:38:55.988" v="2141" actId="1076"/>
+          <ac:spMkLst>
+            <pc:docMk/>
+            <pc:sldMk cId="3977715652" sldId="278"/>
+            <ac:spMk id="7" creationId="{93E61358-0533-3AA7-1196-016CBFFE4947}"/>
+          </ac:spMkLst>
+        </pc:spChg>
+        <pc:spChg chg="add mod">
+          <ac:chgData name="Shahbaz Chaudhary" userId="fef21e47db54da50" providerId="LiveId" clId="{D58A60B7-084E-45CF-BD23-7CA072B788BD}" dt="2024-01-17T17:39:21.890" v="2190" actId="1076"/>
+          <ac:spMkLst>
+            <pc:docMk/>
+            <pc:sldMk cId="3977715652" sldId="278"/>
+            <ac:spMk id="8" creationId="{BA547222-6DC6-6AFA-51B5-AFD6ADF7A6A1}"/>
+          </ac:spMkLst>
+        </pc:spChg>
+        <pc:spChg chg="add mod">
+          <ac:chgData name="Shahbaz Chaudhary" userId="fef21e47db54da50" providerId="LiveId" clId="{D58A60B7-084E-45CF-BD23-7CA072B788BD}" dt="2024-01-17T17:40:16.750" v="2233" actId="1076"/>
+          <ac:spMkLst>
+            <pc:docMk/>
+            <pc:sldMk cId="3977715652" sldId="278"/>
+            <ac:spMk id="9" creationId="{1506BA93-CE1B-72EE-5D73-9316E065EF3E}"/>
+          </ac:spMkLst>
+        </pc:spChg>
+        <pc:spChg chg="add mod">
+          <ac:chgData name="Shahbaz Chaudhary" userId="fef21e47db54da50" providerId="LiveId" clId="{D58A60B7-084E-45CF-BD23-7CA072B788BD}" dt="2024-01-17T17:40:38.225" v="2258" actId="20577"/>
+          <ac:spMkLst>
+            <pc:docMk/>
+            <pc:sldMk cId="3977715652" sldId="278"/>
+            <ac:spMk id="10" creationId="{6B3BAD01-8E32-6198-0C15-EFD6AF7AA060}"/>
+          </ac:spMkLst>
+        </pc:spChg>
         <pc:picChg chg="add mod">
-          <ac:chgData name="Shahbaz Chaudhary" userId="fef21e47db54da50" providerId="LiveId" clId="{D58A60B7-084E-45CF-BD23-7CA072B788BD}" dt="2024-01-17T17:33:56.819" v="2098" actId="1076"/>
+          <ac:chgData name="Shahbaz Chaudhary" userId="fef21e47db54da50" providerId="LiveId" clId="{D58A60B7-084E-45CF-BD23-7CA072B788BD}" dt="2024-01-17T17:36:17.910" v="2109" actId="14100"/>
           <ac:picMkLst>
             <pc:docMk/>
             <pc:sldMk cId="3977715652" sldId="278"/>
             <ac:picMk id="5" creationId="{E2A7C0B9-D3F8-55E0-FA11-E152E5DFB682}"/>
+          </ac:picMkLst>
+        </pc:picChg>
+        <pc:picChg chg="add mod">
+          <ac:chgData name="Shahbaz Chaudhary" userId="fef21e47db54da50" providerId="LiveId" clId="{D58A60B7-084E-45CF-BD23-7CA072B788BD}" dt="2024-01-17T17:36:36.645" v="2112" actId="1076"/>
+          <ac:picMkLst>
+            <pc:docMk/>
+            <pc:sldMk cId="3977715652" sldId="278"/>
+            <ac:picMk id="6" creationId="{825A8E14-471B-1FF5-E71E-F9F7A6C351D5}"/>
+          </ac:picMkLst>
+        </pc:picChg>
+      </pc:sldChg>
+      <pc:sldChg chg="addSp modSp new mod">
+        <pc:chgData name="Shahbaz Chaudhary" userId="fef21e47db54da50" providerId="LiveId" clId="{D58A60B7-084E-45CF-BD23-7CA072B788BD}" dt="2024-01-17T17:48:28.109" v="2811" actId="313"/>
+        <pc:sldMkLst>
+          <pc:docMk/>
+          <pc:sldMk cId="2641454909" sldId="279"/>
+        </pc:sldMkLst>
+        <pc:spChg chg="mod">
+          <ac:chgData name="Shahbaz Chaudhary" userId="fef21e47db54da50" providerId="LiveId" clId="{D58A60B7-084E-45CF-BD23-7CA072B788BD}" dt="2024-01-17T17:41:50.762" v="2302" actId="20577"/>
+          <ac:spMkLst>
+            <pc:docMk/>
+            <pc:sldMk cId="2641454909" sldId="279"/>
+            <ac:spMk id="2" creationId="{EDFB0D80-CB44-017A-52D2-68B27A2943CC}"/>
+          </ac:spMkLst>
+        </pc:spChg>
+        <pc:spChg chg="add mod">
+          <ac:chgData name="Shahbaz Chaudhary" userId="fef21e47db54da50" providerId="LiveId" clId="{D58A60B7-084E-45CF-BD23-7CA072B788BD}" dt="2024-01-17T17:48:28.109" v="2811" actId="313"/>
+          <ac:spMkLst>
+            <pc:docMk/>
+            <pc:sldMk cId="2641454909" sldId="279"/>
+            <ac:spMk id="10" creationId="{2DE1C7C9-7D41-2C76-9272-795E6936EEAA}"/>
+          </ac:spMkLst>
+        </pc:spChg>
+        <pc:picChg chg="add mod">
+          <ac:chgData name="Shahbaz Chaudhary" userId="fef21e47db54da50" providerId="LiveId" clId="{D58A60B7-084E-45CF-BD23-7CA072B788BD}" dt="2024-01-17T17:44:57.842" v="2446" actId="1038"/>
+          <ac:picMkLst>
+            <pc:docMk/>
+            <pc:sldMk cId="2641454909" sldId="279"/>
+            <ac:picMk id="4" creationId="{84F241CF-3E45-A0CA-C5EC-2C4D43DAD2BF}"/>
+          </ac:picMkLst>
+        </pc:picChg>
+        <pc:picChg chg="add mod">
+          <ac:chgData name="Shahbaz Chaudhary" userId="fef21e47db54da50" providerId="LiveId" clId="{D58A60B7-084E-45CF-BD23-7CA072B788BD}" dt="2024-01-17T17:44:57.842" v="2446" actId="1038"/>
+          <ac:picMkLst>
+            <pc:docMk/>
+            <pc:sldMk cId="2641454909" sldId="279"/>
+            <ac:picMk id="6" creationId="{88376052-85DA-F9BC-A2E9-DA3BB743E474}"/>
+          </ac:picMkLst>
+        </pc:picChg>
+        <pc:picChg chg="add mod">
+          <ac:chgData name="Shahbaz Chaudhary" userId="fef21e47db54da50" providerId="LiveId" clId="{D58A60B7-084E-45CF-BD23-7CA072B788BD}" dt="2024-01-17T17:44:57.842" v="2446" actId="1038"/>
+          <ac:picMkLst>
+            <pc:docMk/>
+            <pc:sldMk cId="2641454909" sldId="279"/>
+            <ac:picMk id="8" creationId="{339CD682-116A-7DE8-C3CD-CBD644758A42}"/>
+          </ac:picMkLst>
+        </pc:picChg>
+        <pc:picChg chg="add mod">
+          <ac:chgData name="Shahbaz Chaudhary" userId="fef21e47db54da50" providerId="LiveId" clId="{D58A60B7-084E-45CF-BD23-7CA072B788BD}" dt="2024-01-17T17:44:57.842" v="2446" actId="1038"/>
+          <ac:picMkLst>
+            <pc:docMk/>
+            <pc:sldMk cId="2641454909" sldId="279"/>
+            <ac:picMk id="9" creationId="{A23156BD-A6DB-8B49-6E65-D657C163D54D}"/>
           </ac:picMkLst>
         </pc:picChg>
       </pc:sldChg>
@@ -1197,7 +1298,7 @@
           <a:p>
             <a:fld id="{736637C2-0074-4FEF-AEBC-2720ADB5AC51}" type="datetimeFigureOut">
               <a:rPr lang="en-US" smtClean="0"/>
-              <a:t>1/16/2024</a:t>
+              <a:t>1/17/2024</a:t>
             </a:fld>
             <a:endParaRPr lang="en-US"/>
           </a:p>
@@ -1427,7 +1528,7 @@
           <a:p>
             <a:fld id="{736637C2-0074-4FEF-AEBC-2720ADB5AC51}" type="datetimeFigureOut">
               <a:rPr lang="en-US" smtClean="0"/>
-              <a:t>1/16/2024</a:t>
+              <a:t>1/17/2024</a:t>
             </a:fld>
             <a:endParaRPr lang="en-US"/>
           </a:p>
@@ -1667,7 +1768,7 @@
           <a:p>
             <a:fld id="{736637C2-0074-4FEF-AEBC-2720ADB5AC51}" type="datetimeFigureOut">
               <a:rPr lang="en-US" smtClean="0"/>
-              <a:t>1/16/2024</a:t>
+              <a:t>1/17/2024</a:t>
             </a:fld>
             <a:endParaRPr lang="en-US"/>
           </a:p>
@@ -1897,7 +1998,7 @@
           <a:p>
             <a:fld id="{736637C2-0074-4FEF-AEBC-2720ADB5AC51}" type="datetimeFigureOut">
               <a:rPr lang="en-US" smtClean="0"/>
-              <a:t>1/16/2024</a:t>
+              <a:t>1/17/2024</a:t>
             </a:fld>
             <a:endParaRPr lang="en-US"/>
           </a:p>
@@ -2149,7 +2250,7 @@
           <a:p>
             <a:fld id="{736637C2-0074-4FEF-AEBC-2720ADB5AC51}" type="datetimeFigureOut">
               <a:rPr lang="en-US" smtClean="0"/>
-              <a:t>1/16/2024</a:t>
+              <a:t>1/17/2024</a:t>
             </a:fld>
             <a:endParaRPr lang="en-US"/>
           </a:p>
@@ -2381,7 +2482,7 @@
           <a:p>
             <a:fld id="{736637C2-0074-4FEF-AEBC-2720ADB5AC51}" type="datetimeFigureOut">
               <a:rPr lang="en-US" smtClean="0"/>
-              <a:t>1/16/2024</a:t>
+              <a:t>1/17/2024</a:t>
             </a:fld>
             <a:endParaRPr lang="en-US"/>
           </a:p>
@@ -2748,7 +2849,7 @@
           <a:p>
             <a:fld id="{736637C2-0074-4FEF-AEBC-2720ADB5AC51}" type="datetimeFigureOut">
               <a:rPr lang="en-US" smtClean="0"/>
-              <a:t>1/16/2024</a:t>
+              <a:t>1/17/2024</a:t>
             </a:fld>
             <a:endParaRPr lang="en-US"/>
           </a:p>
@@ -2876,7 +2977,7 @@
           <a:p>
             <a:fld id="{736637C2-0074-4FEF-AEBC-2720ADB5AC51}" type="datetimeFigureOut">
               <a:rPr lang="en-US" smtClean="0"/>
-              <a:t>1/16/2024</a:t>
+              <a:t>1/17/2024</a:t>
             </a:fld>
             <a:endParaRPr lang="en-US"/>
           </a:p>
@@ -2971,7 +3072,7 @@
           <a:p>
             <a:fld id="{736637C2-0074-4FEF-AEBC-2720ADB5AC51}" type="datetimeFigureOut">
               <a:rPr lang="en-US" smtClean="0"/>
-              <a:t>1/16/2024</a:t>
+              <a:t>1/17/2024</a:t>
             </a:fld>
             <a:endParaRPr lang="en-US"/>
           </a:p>
@@ -3248,7 +3349,7 @@
           <a:p>
             <a:fld id="{736637C2-0074-4FEF-AEBC-2720ADB5AC51}" type="datetimeFigureOut">
               <a:rPr lang="en-US" smtClean="0"/>
-              <a:t>1/16/2024</a:t>
+              <a:t>1/17/2024</a:t>
             </a:fld>
             <a:endParaRPr lang="en-US"/>
           </a:p>
@@ -3505,7 +3606,7 @@
           <a:p>
             <a:fld id="{736637C2-0074-4FEF-AEBC-2720ADB5AC51}" type="datetimeFigureOut">
               <a:rPr lang="en-US" smtClean="0"/>
-              <a:t>1/16/2024</a:t>
+              <a:t>1/17/2024</a:t>
             </a:fld>
             <a:endParaRPr lang="en-US"/>
           </a:p>
@@ -3721,7 +3822,7 @@
           <a:p>
             <a:fld id="{736637C2-0074-4FEF-AEBC-2720ADB5AC51}" type="datetimeFigureOut">
               <a:rPr lang="en-US" smtClean="0"/>
-              <a:t>1/16/2024</a:t>
+              <a:t>1/17/2024</a:t>
             </a:fld>
             <a:endParaRPr lang="en-US"/>
           </a:p>
@@ -11177,7 +11278,7 @@
           <p:cNvPr id="2" name="Title 1">
             <a:extLst>
               <a:ext uri="{FF2B5EF4-FFF2-40B4-BE49-F238E27FC236}">
-                <a16:creationId xmlns:a16="http://schemas.microsoft.com/office/drawing/2014/main" id="{E40F824C-9119-D7CE-F06B-052C347712BF}"/>
+                <a16:creationId xmlns:a16="http://schemas.microsoft.com/office/drawing/2014/main" id="{EDFB0D80-CB44-017A-52D2-68B27A2943CC}"/>
               </a:ext>
             </a:extLst>
           </p:cNvPr>
@@ -11195,110 +11296,25 @@
           <a:p>
             <a:r>
               <a:rPr lang="en-US" dirty="0"/>
-              <a:t>Create a repo and </a:t>
-            </a:r>
-            <a:r>
-              <a:rPr lang="en-US" dirty="0">
-                <a:latin typeface="Consolas" panose="020B0609020204030204" pitchFamily="49" charset="0"/>
-              </a:rPr>
-              <a:t>git push </a:t>
+              <a:t>Git is a </a:t>
+            </a:r>
+            <a:r>
+              <a:rPr lang="en-US" i="1" dirty="0"/>
+              <a:t>distributed</a:t>
             </a:r>
             <a:r>
               <a:rPr lang="en-US" dirty="0"/>
-              <a:t>to it</a:t>
-            </a:r>
-          </a:p>
-        </p:txBody>
-      </p:sp>
-      <p:sp>
-        <p:nvSpPr>
-          <p:cNvPr id="3" name="TextBox 2">
-            <a:extLst>
-              <a:ext uri="{FF2B5EF4-FFF2-40B4-BE49-F238E27FC236}">
-                <a16:creationId xmlns:a16="http://schemas.microsoft.com/office/drawing/2014/main" id="{E19DCBD9-6321-0818-3D62-1148817A0583}"/>
-              </a:ext>
-            </a:extLst>
-          </p:cNvPr>
-          <p:cNvSpPr txBox="1"/>
-          <p:nvPr/>
-        </p:nvSpPr>
-        <p:spPr>
-          <a:xfrm>
-            <a:off x="956930" y="1828800"/>
-            <a:ext cx="10134506" cy="2031325"/>
-          </a:xfrm>
-          <a:prstGeom prst="rect">
-            <a:avLst/>
-          </a:prstGeom>
-          <a:noFill/>
-        </p:spPr>
-        <p:txBody>
-          <a:bodyPr wrap="none" rtlCol="0">
-            <a:spAutoFit/>
-          </a:bodyPr>
-          <a:lstStyle/>
-          <a:p>
-            <a:r>
-              <a:rPr lang="en-US" dirty="0"/>
-              <a:t>So far, we have had only one way interactions with repositories. Now we need to go the other way.</a:t>
-            </a:r>
-          </a:p>
-          <a:p>
-            <a:endParaRPr lang="en-US" dirty="0"/>
-          </a:p>
-          <a:p>
-            <a:pPr marL="342900" indent="-342900">
-              <a:buAutoNum type="arabicPeriod"/>
-            </a:pPr>
-            <a:r>
-              <a:rPr lang="en-US" dirty="0"/>
-              <a:t>Create an account on GitHub (pick your name wisely, it will be your internet identity)</a:t>
-            </a:r>
-          </a:p>
-          <a:p>
-            <a:pPr marL="342900" indent="-342900">
-              <a:buAutoNum type="arabicPeriod"/>
-            </a:pPr>
-            <a:r>
-              <a:rPr lang="en-US" dirty="0"/>
-              <a:t>Create a new repository</a:t>
-            </a:r>
-          </a:p>
-          <a:p>
-            <a:pPr marL="342900" indent="-342900">
-              <a:buAutoNum type="arabicPeriod"/>
-            </a:pPr>
-            <a:r>
-              <a:rPr lang="en-US" dirty="0"/>
-              <a:t>Clone it</a:t>
-            </a:r>
-          </a:p>
-          <a:p>
-            <a:pPr marL="342900" indent="-342900">
-              <a:buAutoNum type="arabicPeriod"/>
-            </a:pPr>
-            <a:r>
-              <a:rPr lang="en-US" dirty="0"/>
-              <a:t>Add a new file to it</a:t>
-            </a:r>
-          </a:p>
-          <a:p>
-            <a:pPr marL="342900" indent="-342900">
-              <a:buAutoNum type="arabicPeriod"/>
-            </a:pPr>
-            <a:r>
-              <a:rPr lang="en-US" b="1" dirty="0"/>
-              <a:t>How has the status changed?</a:t>
+              <a:t> version control system</a:t>
             </a:r>
           </a:p>
         </p:txBody>
       </p:sp>
       <p:pic>
         <p:nvPicPr>
-          <p:cNvPr id="5" name="Picture 4">
-            <a:extLst>
-              <a:ext uri="{FF2B5EF4-FFF2-40B4-BE49-F238E27FC236}">
-                <a16:creationId xmlns:a16="http://schemas.microsoft.com/office/drawing/2014/main" id="{E2A7C0B9-D3F8-55E0-FA11-E152E5DFB682}"/>
+          <p:cNvPr id="4" name="Graphic 3" descr="Connections outline">
+            <a:extLst>
+              <a:ext uri="{FF2B5EF4-FFF2-40B4-BE49-F238E27FC236}">
+                <a16:creationId xmlns:a16="http://schemas.microsoft.com/office/drawing/2014/main" id="{84F241CF-3E45-A0CA-C5EC-2C4D43DAD2BF}"/>
               </a:ext>
             </a:extLst>
           </p:cNvPr>
@@ -11308,25 +11324,240 @@
           <p:nvPr/>
         </p:nvPicPr>
         <p:blipFill>
-          <a:blip r:embed="rId2"/>
+          <a:blip r:embed="rId2">
+            <a:extLst>
+              <a:ext uri="{28A0092B-C50C-407E-A947-70E740481C1C}">
+                <a14:useLocalDpi xmlns:a14="http://schemas.microsoft.com/office/drawing/2010/main" val="0"/>
+              </a:ext>
+              <a:ext uri="{96DAC541-7B7A-43D3-8B79-37D633B846F1}">
+                <asvg:svgBlip xmlns:asvg="http://schemas.microsoft.com/office/drawing/2016/SVG/main" r:embed="rId3"/>
+              </a:ext>
+            </a:extLst>
+          </a:blip>
           <a:stretch>
             <a:fillRect/>
           </a:stretch>
         </p:blipFill>
         <p:spPr>
           <a:xfrm>
-            <a:off x="5113919" y="2844462"/>
-            <a:ext cx="4877481" cy="3915321"/>
+            <a:off x="8006634" y="2259531"/>
+            <a:ext cx="914400" cy="914400"/>
           </a:xfrm>
           <a:prstGeom prst="rect">
             <a:avLst/>
           </a:prstGeom>
         </p:spPr>
       </p:pic>
+      <p:pic>
+        <p:nvPicPr>
+          <p:cNvPr id="6" name="Graphic 5" descr="Laptop outline">
+            <a:extLst>
+              <a:ext uri="{FF2B5EF4-FFF2-40B4-BE49-F238E27FC236}">
+                <a16:creationId xmlns:a16="http://schemas.microsoft.com/office/drawing/2014/main" id="{88376052-85DA-F9BC-A2E9-DA3BB743E474}"/>
+              </a:ext>
+            </a:extLst>
+          </p:cNvPr>
+          <p:cNvPicPr>
+            <a:picLocks noChangeAspect="1"/>
+          </p:cNvPicPr>
+          <p:nvPr/>
+        </p:nvPicPr>
+        <p:blipFill>
+          <a:blip r:embed="rId4">
+            <a:extLst>
+              <a:ext uri="{28A0092B-C50C-407E-A947-70E740481C1C}">
+                <a14:useLocalDpi xmlns:a14="http://schemas.microsoft.com/office/drawing/2010/main" val="0"/>
+              </a:ext>
+              <a:ext uri="{96DAC541-7B7A-43D3-8B79-37D633B846F1}">
+                <asvg:svgBlip xmlns:asvg="http://schemas.microsoft.com/office/drawing/2016/SVG/main" r:embed="rId5"/>
+              </a:ext>
+            </a:extLst>
+          </a:blip>
+          <a:stretch>
+            <a:fillRect/>
+          </a:stretch>
+        </p:blipFill>
+        <p:spPr>
+          <a:xfrm>
+            <a:off x="7575103" y="4417428"/>
+            <a:ext cx="1934678" cy="1934678"/>
+          </a:xfrm>
+          <a:prstGeom prst="rect">
+            <a:avLst/>
+          </a:prstGeom>
+        </p:spPr>
+      </p:pic>
+      <p:pic>
+        <p:nvPicPr>
+          <p:cNvPr id="8" name="Graphic 7" descr="Computer outline">
+            <a:extLst>
+              <a:ext uri="{FF2B5EF4-FFF2-40B4-BE49-F238E27FC236}">
+                <a16:creationId xmlns:a16="http://schemas.microsoft.com/office/drawing/2014/main" id="{339CD682-116A-7DE8-C3CD-CBD644758A42}"/>
+              </a:ext>
+            </a:extLst>
+          </p:cNvPr>
+          <p:cNvPicPr>
+            <a:picLocks noChangeAspect="1"/>
+          </p:cNvPicPr>
+          <p:nvPr/>
+        </p:nvPicPr>
+        <p:blipFill>
+          <a:blip r:embed="rId6">
+            <a:extLst>
+              <a:ext uri="{28A0092B-C50C-407E-A947-70E740481C1C}">
+                <a14:useLocalDpi xmlns:a14="http://schemas.microsoft.com/office/drawing/2010/main" val="0"/>
+              </a:ext>
+              <a:ext uri="{96DAC541-7B7A-43D3-8B79-37D633B846F1}">
+                <asvg:svgBlip xmlns:asvg="http://schemas.microsoft.com/office/drawing/2016/SVG/main" r:embed="rId7"/>
+              </a:ext>
+            </a:extLst>
+          </a:blip>
+          <a:stretch>
+            <a:fillRect/>
+          </a:stretch>
+        </p:blipFill>
+        <p:spPr>
+          <a:xfrm>
+            <a:off x="7278322" y="1083644"/>
+            <a:ext cx="3776312" cy="3776312"/>
+          </a:xfrm>
+          <a:prstGeom prst="rect">
+            <a:avLst/>
+          </a:prstGeom>
+        </p:spPr>
+      </p:pic>
+      <p:pic>
+        <p:nvPicPr>
+          <p:cNvPr id="9" name="Graphic 8" descr="Connections outline">
+            <a:extLst>
+              <a:ext uri="{FF2B5EF4-FFF2-40B4-BE49-F238E27FC236}">
+                <a16:creationId xmlns:a16="http://schemas.microsoft.com/office/drawing/2014/main" id="{A23156BD-A6DB-8B49-6E65-D657C163D54D}"/>
+              </a:ext>
+            </a:extLst>
+          </p:cNvPr>
+          <p:cNvPicPr>
+            <a:picLocks noChangeAspect="1"/>
+          </p:cNvPicPr>
+          <p:nvPr/>
+        </p:nvPicPr>
+        <p:blipFill>
+          <a:blip r:embed="rId2">
+            <a:extLst>
+              <a:ext uri="{28A0092B-C50C-407E-A947-70E740481C1C}">
+                <a14:useLocalDpi xmlns:a14="http://schemas.microsoft.com/office/drawing/2010/main" val="0"/>
+              </a:ext>
+              <a:ext uri="{96DAC541-7B7A-43D3-8B79-37D633B846F1}">
+                <asvg:svgBlip xmlns:asvg="http://schemas.microsoft.com/office/drawing/2016/SVG/main" r:embed="rId3"/>
+              </a:ext>
+            </a:extLst>
+          </a:blip>
+          <a:stretch>
+            <a:fillRect/>
+          </a:stretch>
+        </p:blipFill>
+        <p:spPr>
+          <a:xfrm>
+            <a:off x="8286572" y="5066735"/>
+            <a:ext cx="511740" cy="511740"/>
+          </a:xfrm>
+          <a:prstGeom prst="rect">
+            <a:avLst/>
+          </a:prstGeom>
+        </p:spPr>
+      </p:pic>
+      <p:sp>
+        <p:nvSpPr>
+          <p:cNvPr id="10" name="TextBox 9">
+            <a:extLst>
+              <a:ext uri="{FF2B5EF4-FFF2-40B4-BE49-F238E27FC236}">
+                <a16:creationId xmlns:a16="http://schemas.microsoft.com/office/drawing/2014/main" id="{2DE1C7C9-7D41-2C76-9272-795E6936EEAA}"/>
+              </a:ext>
+            </a:extLst>
+          </p:cNvPr>
+          <p:cNvSpPr txBox="1"/>
+          <p:nvPr/>
+        </p:nvSpPr>
+        <p:spPr>
+          <a:xfrm>
+            <a:off x="838200" y="2274633"/>
+            <a:ext cx="5707781" cy="2585323"/>
+          </a:xfrm>
+          <a:prstGeom prst="rect">
+            <a:avLst/>
+          </a:prstGeom>
+          <a:noFill/>
+        </p:spPr>
+        <p:txBody>
+          <a:bodyPr wrap="square" rtlCol="0">
+            <a:spAutoFit/>
+          </a:bodyPr>
+          <a:lstStyle/>
+          <a:p>
+            <a:r>
+              <a:rPr lang="en-US" dirty="0"/>
+              <a:t>When you </a:t>
+            </a:r>
+            <a:r>
+              <a:rPr lang="en-US" dirty="0">
+                <a:latin typeface="Consolas" panose="020B0609020204030204" pitchFamily="49" charset="0"/>
+              </a:rPr>
+              <a:t>clone</a:t>
+            </a:r>
+            <a:r>
+              <a:rPr lang="en-US" dirty="0"/>
+              <a:t> a repository, you are pulling down all the files </a:t>
+            </a:r>
+            <a:r>
+              <a:rPr lang="en-US" i="1" dirty="0"/>
+              <a:t>and their history</a:t>
+            </a:r>
+            <a:r>
+              <a:rPr lang="en-US" dirty="0"/>
+              <a:t>. </a:t>
+            </a:r>
+          </a:p>
+          <a:p>
+            <a:endParaRPr lang="en-US" dirty="0"/>
+          </a:p>
+          <a:p>
+            <a:r>
+              <a:rPr lang="en-US" dirty="0"/>
+              <a:t>You then operate only on the </a:t>
+            </a:r>
+            <a:r>
+              <a:rPr lang="en-US" i="1" dirty="0"/>
+              <a:t>local </a:t>
+            </a:r>
+            <a:r>
+              <a:rPr lang="en-US" dirty="0"/>
+              <a:t>copy. If you want to sync the changes, you have to explicitly </a:t>
+            </a:r>
+            <a:r>
+              <a:rPr lang="en-US" dirty="0">
+                <a:latin typeface="Consolas" panose="020B0609020204030204" pitchFamily="49" charset="0"/>
+              </a:rPr>
+              <a:t>push</a:t>
+            </a:r>
+            <a:r>
+              <a:rPr lang="en-US" dirty="0"/>
+              <a:t> the changes back.</a:t>
+            </a:r>
+          </a:p>
+          <a:p>
+            <a:endParaRPr lang="en-US" dirty="0"/>
+          </a:p>
+          <a:p>
+            <a:r>
+              <a:rPr lang="en-US" dirty="0"/>
+              <a:t>Git operates as a giant network of peers, not as a remote/local hierarchy</a:t>
+            </a:r>
+          </a:p>
+        </p:txBody>
+      </p:sp>
     </p:spTree>
     <p:extLst>
       <p:ext uri="{BB962C8B-B14F-4D97-AF65-F5344CB8AC3E}">
-        <p14:creationId xmlns:p14="http://schemas.microsoft.com/office/powerpoint/2010/main" val="3977715652"/>
+        <p14:creationId xmlns:p14="http://schemas.microsoft.com/office/powerpoint/2010/main" val="2641454909"/>
       </p:ext>
     </p:extLst>
   </p:cSld>
@@ -11358,6 +11589,417 @@
           <p:cNvPr id="2" name="Title 1">
             <a:extLst>
               <a:ext uri="{FF2B5EF4-FFF2-40B4-BE49-F238E27FC236}">
+                <a16:creationId xmlns:a16="http://schemas.microsoft.com/office/drawing/2014/main" id="{E40F824C-9119-D7CE-F06B-052C347712BF}"/>
+              </a:ext>
+            </a:extLst>
+          </p:cNvPr>
+          <p:cNvSpPr>
+            <a:spLocks noGrp="1"/>
+          </p:cNvSpPr>
+          <p:nvPr>
+            <p:ph type="title"/>
+          </p:nvPr>
+        </p:nvSpPr>
+        <p:spPr/>
+        <p:txBody>
+          <a:bodyPr/>
+          <a:lstStyle/>
+          <a:p>
+            <a:r>
+              <a:rPr lang="en-US" dirty="0"/>
+              <a:t>Create a repo, </a:t>
+            </a:r>
+            <a:r>
+              <a:rPr lang="en-US" dirty="0">
+                <a:latin typeface="Consolas" panose="020B0609020204030204" pitchFamily="49" charset="0"/>
+              </a:rPr>
+              <a:t>git commit </a:t>
+            </a:r>
+            <a:r>
+              <a:rPr lang="en-US" dirty="0"/>
+              <a:t>and </a:t>
+            </a:r>
+            <a:r>
+              <a:rPr lang="en-US" dirty="0">
+                <a:latin typeface="Consolas" panose="020B0609020204030204" pitchFamily="49" charset="0"/>
+              </a:rPr>
+              <a:t>git push </a:t>
+            </a:r>
+            <a:r>
+              <a:rPr lang="en-US" dirty="0"/>
+              <a:t>to it</a:t>
+            </a:r>
+          </a:p>
+        </p:txBody>
+      </p:sp>
+      <p:sp>
+        <p:nvSpPr>
+          <p:cNvPr id="3" name="TextBox 2">
+            <a:extLst>
+              <a:ext uri="{FF2B5EF4-FFF2-40B4-BE49-F238E27FC236}">
+                <a16:creationId xmlns:a16="http://schemas.microsoft.com/office/drawing/2014/main" id="{E19DCBD9-6321-0818-3D62-1148817A0583}"/>
+              </a:ext>
+            </a:extLst>
+          </p:cNvPr>
+          <p:cNvSpPr txBox="1"/>
+          <p:nvPr/>
+        </p:nvSpPr>
+        <p:spPr>
+          <a:xfrm>
+            <a:off x="956930" y="1828800"/>
+            <a:ext cx="6317449" cy="2585323"/>
+          </a:xfrm>
+          <a:prstGeom prst="rect">
+            <a:avLst/>
+          </a:prstGeom>
+          <a:noFill/>
+        </p:spPr>
+        <p:txBody>
+          <a:bodyPr wrap="square" rtlCol="0">
+            <a:spAutoFit/>
+          </a:bodyPr>
+          <a:lstStyle/>
+          <a:p>
+            <a:r>
+              <a:rPr lang="en-US" dirty="0"/>
+              <a:t>So far, we have had only one way interactions with repositories. Now we need to go the other way.</a:t>
+            </a:r>
+          </a:p>
+          <a:p>
+            <a:endParaRPr lang="en-US" dirty="0"/>
+          </a:p>
+          <a:p>
+            <a:pPr marL="342900" indent="-342900">
+              <a:buAutoNum type="arabicPeriod"/>
+            </a:pPr>
+            <a:r>
+              <a:rPr lang="en-US" dirty="0"/>
+              <a:t>Create an account on GitHub (pick your name wisely, it will be your internet identity)</a:t>
+            </a:r>
+          </a:p>
+          <a:p>
+            <a:pPr marL="342900" indent="-342900">
+              <a:buAutoNum type="arabicPeriod"/>
+            </a:pPr>
+            <a:r>
+              <a:rPr lang="en-US" dirty="0"/>
+              <a:t>Create a new repository</a:t>
+            </a:r>
+          </a:p>
+          <a:p>
+            <a:pPr marL="342900" indent="-342900">
+              <a:buAutoNum type="arabicPeriod"/>
+            </a:pPr>
+            <a:r>
+              <a:rPr lang="en-US" dirty="0"/>
+              <a:t>Clone it</a:t>
+            </a:r>
+          </a:p>
+          <a:p>
+            <a:pPr marL="342900" indent="-342900">
+              <a:buAutoNum type="arabicPeriod"/>
+            </a:pPr>
+            <a:r>
+              <a:rPr lang="en-US" dirty="0"/>
+              <a:t>Add a new file to it</a:t>
+            </a:r>
+          </a:p>
+          <a:p>
+            <a:pPr marL="342900" indent="-342900">
+              <a:buAutoNum type="arabicPeriod"/>
+            </a:pPr>
+            <a:r>
+              <a:rPr lang="en-US" b="1" dirty="0"/>
+              <a:t>How has the status changed?</a:t>
+            </a:r>
+          </a:p>
+        </p:txBody>
+      </p:sp>
+      <p:pic>
+        <p:nvPicPr>
+          <p:cNvPr id="5" name="Picture 4">
+            <a:extLst>
+              <a:ext uri="{FF2B5EF4-FFF2-40B4-BE49-F238E27FC236}">
+                <a16:creationId xmlns:a16="http://schemas.microsoft.com/office/drawing/2014/main" id="{E2A7C0B9-D3F8-55E0-FA11-E152E5DFB682}"/>
+              </a:ext>
+            </a:extLst>
+          </p:cNvPr>
+          <p:cNvPicPr>
+            <a:picLocks noChangeAspect="1"/>
+          </p:cNvPicPr>
+          <p:nvPr/>
+        </p:nvPicPr>
+        <p:blipFill>
+          <a:blip r:embed="rId2"/>
+          <a:stretch>
+            <a:fillRect/>
+          </a:stretch>
+        </p:blipFill>
+        <p:spPr>
+          <a:xfrm>
+            <a:off x="7484055" y="1589482"/>
+            <a:ext cx="3751015" cy="3011069"/>
+          </a:xfrm>
+          <a:prstGeom prst="rect">
+            <a:avLst/>
+          </a:prstGeom>
+          <a:effectLst>
+            <a:outerShdw blurRad="50800" dist="38100" dir="2700000" algn="tl" rotWithShape="0">
+              <a:prstClr val="black">
+                <a:alpha val="40000"/>
+              </a:prstClr>
+            </a:outerShdw>
+          </a:effectLst>
+        </p:spPr>
+      </p:pic>
+      <p:pic>
+        <p:nvPicPr>
+          <p:cNvPr id="6" name="Picture 5">
+            <a:extLst>
+              <a:ext uri="{FF2B5EF4-FFF2-40B4-BE49-F238E27FC236}">
+                <a16:creationId xmlns:a16="http://schemas.microsoft.com/office/drawing/2014/main" id="{825A8E14-471B-1FF5-E71E-F9F7A6C351D5}"/>
+              </a:ext>
+            </a:extLst>
+          </p:cNvPr>
+          <p:cNvPicPr>
+            <a:picLocks noChangeAspect="1"/>
+          </p:cNvPicPr>
+          <p:nvPr/>
+        </p:nvPicPr>
+        <p:blipFill>
+          <a:blip r:embed="rId3"/>
+          <a:stretch>
+            <a:fillRect/>
+          </a:stretch>
+        </p:blipFill>
+        <p:spPr>
+          <a:xfrm>
+            <a:off x="1505352" y="5078186"/>
+            <a:ext cx="9729718" cy="831337"/>
+          </a:xfrm>
+          <a:prstGeom prst="rect">
+            <a:avLst/>
+          </a:prstGeom>
+          <a:effectLst>
+            <a:outerShdw blurRad="50800" dist="38100" dir="2700000" algn="tl" rotWithShape="0">
+              <a:prstClr val="black">
+                <a:alpha val="40000"/>
+              </a:prstClr>
+            </a:outerShdw>
+          </a:effectLst>
+        </p:spPr>
+      </p:pic>
+      <p:sp>
+        <p:nvSpPr>
+          <p:cNvPr id="7" name="Arrow: Up 6">
+            <a:extLst>
+              <a:ext uri="{FF2B5EF4-FFF2-40B4-BE49-F238E27FC236}">
+                <a16:creationId xmlns:a16="http://schemas.microsoft.com/office/drawing/2014/main" id="{93E61358-0533-3AA7-1196-016CBFFE4947}"/>
+              </a:ext>
+            </a:extLst>
+          </p:cNvPr>
+          <p:cNvSpPr/>
+          <p:nvPr/>
+        </p:nvSpPr>
+        <p:spPr>
+          <a:xfrm rot="6118333">
+            <a:off x="7048376" y="3606281"/>
+            <a:ext cx="265253" cy="563336"/>
+          </a:xfrm>
+          <a:prstGeom prst="upArrow">
+            <a:avLst/>
+          </a:prstGeom>
+        </p:spPr>
+        <p:style>
+          <a:lnRef idx="2">
+            <a:schemeClr val="accent1">
+              <a:shade val="15000"/>
+            </a:schemeClr>
+          </a:lnRef>
+          <a:fillRef idx="1">
+            <a:schemeClr val="accent1"/>
+          </a:fillRef>
+          <a:effectRef idx="0">
+            <a:schemeClr val="accent1"/>
+          </a:effectRef>
+          <a:fontRef idx="minor">
+            <a:schemeClr val="lt1"/>
+          </a:fontRef>
+        </p:style>
+        <p:txBody>
+          <a:bodyPr rtlCol="0" anchor="ctr"/>
+          <a:lstStyle/>
+          <a:p>
+            <a:pPr algn="ctr"/>
+            <a:endParaRPr lang="en-US"/>
+          </a:p>
+        </p:txBody>
+      </p:sp>
+      <p:sp>
+        <p:nvSpPr>
+          <p:cNvPr id="8" name="Arrow: Up 7">
+            <a:extLst>
+              <a:ext uri="{FF2B5EF4-FFF2-40B4-BE49-F238E27FC236}">
+                <a16:creationId xmlns:a16="http://schemas.microsoft.com/office/drawing/2014/main" id="{BA547222-6DC6-6AFA-51B5-AFD6ADF7A6A1}"/>
+              </a:ext>
+            </a:extLst>
+          </p:cNvPr>
+          <p:cNvSpPr/>
+          <p:nvPr/>
+        </p:nvSpPr>
+        <p:spPr>
+          <a:xfrm rot="2138384">
+            <a:off x="10282112" y="5627139"/>
+            <a:ext cx="265253" cy="563336"/>
+          </a:xfrm>
+          <a:prstGeom prst="upArrow">
+            <a:avLst/>
+          </a:prstGeom>
+        </p:spPr>
+        <p:style>
+          <a:lnRef idx="2">
+            <a:schemeClr val="accent1">
+              <a:shade val="15000"/>
+            </a:schemeClr>
+          </a:lnRef>
+          <a:fillRef idx="1">
+            <a:schemeClr val="accent1"/>
+          </a:fillRef>
+          <a:effectRef idx="0">
+            <a:schemeClr val="accent1"/>
+          </a:effectRef>
+          <a:fontRef idx="minor">
+            <a:schemeClr val="lt1"/>
+          </a:fontRef>
+        </p:style>
+        <p:txBody>
+          <a:bodyPr rtlCol="0" anchor="ctr"/>
+          <a:lstStyle/>
+          <a:p>
+            <a:pPr algn="ctr"/>
+            <a:endParaRPr lang="en-US"/>
+          </a:p>
+        </p:txBody>
+      </p:sp>
+      <p:sp>
+        <p:nvSpPr>
+          <p:cNvPr id="9" name="TextBox 8">
+            <a:extLst>
+              <a:ext uri="{FF2B5EF4-FFF2-40B4-BE49-F238E27FC236}">
+                <a16:creationId xmlns:a16="http://schemas.microsoft.com/office/drawing/2014/main" id="{1506BA93-CE1B-72EE-5D73-9316E065EF3E}"/>
+              </a:ext>
+            </a:extLst>
+          </p:cNvPr>
+          <p:cNvSpPr txBox="1"/>
+          <p:nvPr/>
+        </p:nvSpPr>
+        <p:spPr>
+          <a:xfrm>
+            <a:off x="6096000" y="4006610"/>
+            <a:ext cx="1385860" cy="430887"/>
+          </a:xfrm>
+          <a:prstGeom prst="rect">
+            <a:avLst/>
+          </a:prstGeom>
+          <a:noFill/>
+        </p:spPr>
+        <p:txBody>
+          <a:bodyPr wrap="square" rtlCol="0">
+            <a:spAutoFit/>
+          </a:bodyPr>
+          <a:lstStyle/>
+          <a:p>
+            <a:r>
+              <a:rPr lang="en-US" sz="1100" dirty="0">
+                <a:solidFill>
+                  <a:schemeClr val="tx1">
+                    <a:lumMod val="75000"/>
+                    <a:lumOff val="25000"/>
+                  </a:schemeClr>
+                </a:solidFill>
+              </a:rPr>
+              <a:t>1. “Commit” file to version control</a:t>
+            </a:r>
+          </a:p>
+        </p:txBody>
+      </p:sp>
+      <p:sp>
+        <p:nvSpPr>
+          <p:cNvPr id="10" name="TextBox 9">
+            <a:extLst>
+              <a:ext uri="{FF2B5EF4-FFF2-40B4-BE49-F238E27FC236}">
+                <a16:creationId xmlns:a16="http://schemas.microsoft.com/office/drawing/2014/main" id="{6B3BAD01-8E32-6198-0C15-EFD6AF7AA060}"/>
+              </a:ext>
+            </a:extLst>
+          </p:cNvPr>
+          <p:cNvSpPr txBox="1"/>
+          <p:nvPr/>
+        </p:nvSpPr>
+        <p:spPr>
+          <a:xfrm>
+            <a:off x="9379140" y="6200630"/>
+            <a:ext cx="1385860" cy="430887"/>
+          </a:xfrm>
+          <a:prstGeom prst="rect">
+            <a:avLst/>
+          </a:prstGeom>
+          <a:noFill/>
+        </p:spPr>
+        <p:txBody>
+          <a:bodyPr wrap="square" rtlCol="0">
+            <a:spAutoFit/>
+          </a:bodyPr>
+          <a:lstStyle/>
+          <a:p>
+            <a:r>
+              <a:rPr lang="en-US" sz="1100" dirty="0">
+                <a:solidFill>
+                  <a:schemeClr val="tx1">
+                    <a:lumMod val="75000"/>
+                    <a:lumOff val="25000"/>
+                  </a:schemeClr>
+                </a:solidFill>
+              </a:rPr>
+              <a:t>2. “Push” file to remote repository</a:t>
+            </a:r>
+          </a:p>
+        </p:txBody>
+      </p:sp>
+    </p:spTree>
+    <p:extLst>
+      <p:ext uri="{BB962C8B-B14F-4D97-AF65-F5344CB8AC3E}">
+        <p14:creationId xmlns:p14="http://schemas.microsoft.com/office/powerpoint/2010/main" val="3977715652"/>
+      </p:ext>
+    </p:extLst>
+  </p:cSld>
+  <p:clrMapOvr>
+    <a:masterClrMapping/>
+  </p:clrMapOvr>
+</p:sld>
+</file>
+
+<file path=ppt/slides/slide23.xml><?xml version="1.0" encoding="utf-8"?>
+<p:sld xmlns:a="http://schemas.openxmlformats.org/drawingml/2006/main" xmlns:r="http://schemas.openxmlformats.org/officeDocument/2006/relationships" xmlns:p="http://schemas.openxmlformats.org/presentationml/2006/main">
+  <p:cSld>
+    <p:spTree>
+      <p:nvGrpSpPr>
+        <p:cNvPr id="1" name=""/>
+        <p:cNvGrpSpPr/>
+        <p:nvPr/>
+      </p:nvGrpSpPr>
+      <p:grpSpPr>
+        <a:xfrm>
+          <a:off x="0" y="0"/>
+          <a:ext cx="0" cy="0"/>
+          <a:chOff x="0" y="0"/>
+          <a:chExt cx="0" cy="0"/>
+        </a:xfrm>
+      </p:grpSpPr>
+      <p:sp>
+        <p:nvSpPr>
+          <p:cNvPr id="2" name="Title 1">
+            <a:extLst>
+              <a:ext uri="{FF2B5EF4-FFF2-40B4-BE49-F238E27FC236}">
                 <a16:creationId xmlns:a16="http://schemas.microsoft.com/office/drawing/2014/main" id="{57DBE2BE-31CD-5E69-EAB0-264A1B8771D4}"/>
               </a:ext>
             </a:extLst>
@@ -11419,7 +12061,7 @@
 </p:sld>
 </file>
 
-<file path=ppt/slides/slide23.xml><?xml version="1.0" encoding="utf-8"?>
+<file path=ppt/slides/slide24.xml><?xml version="1.0" encoding="utf-8"?>
 <p:sld xmlns:a="http://schemas.openxmlformats.org/drawingml/2006/main" xmlns:r="http://schemas.openxmlformats.org/officeDocument/2006/relationships" xmlns:p="http://schemas.openxmlformats.org/presentationml/2006/main">
   <p:cSld>
     <p:spTree>

</xml_diff>